<commit_message>
Some features implemented in code but not displaying in project(verification automation)
</commit_message>
<xml_diff>
--- a/ST10448312_POE.pptx
+++ b/ST10448312_POE.pptx
@@ -12,6 +12,9 @@
     <p:sldId id="260" r:id="rId6"/>
     <p:sldId id="261" r:id="rId7"/>
     <p:sldId id="262" r:id="rId8"/>
+    <p:sldId id="263" r:id="rId9"/>
+    <p:sldId id="264" r:id="rId10"/>
+    <p:sldId id="265" r:id="rId11"/>
   </p:sldIdLst>
   <p:sldSz cx="12192000" cy="6858000"/>
   <p:notesSz cx="6858000" cy="9144000"/>
@@ -110,13 +113,18 @@
       </a:defRPr>
     </a:lvl9pPr>
   </p:defaultTextStyle>
+  <p:extLst>
+    <p:ext uri="{EFAFB233-063F-42B5-8137-9DF3F51BA10A}">
+      <p15:sldGuideLst xmlns:p15="http://schemas.microsoft.com/office/powerpoint/2012/main"/>
+    </p:ext>
+  </p:extLst>
 </p:presentation>
 </file>
 
 <file path=ppt/revisionInfo.xml><?xml version="1.0" encoding="utf-8"?>
 <p1510:revInfo xmlns:a="http://schemas.openxmlformats.org/drawingml/2006/main" xmlns:r="http://schemas.openxmlformats.org/officeDocument/2006/relationships" xmlns:p1510="http://schemas.microsoft.com/office/powerpoint/2015/10/main">
   <p1510:revLst>
-    <p1510:client id="{0A935103-5E02-4085-B984-1CFD34CDAA96}" v="10" dt="2025-11-21T13:46:06.646"/>
+    <p1510:client id="{0A935103-5E02-4085-B984-1CFD34CDAA96}" v="15" dt="2025-11-21T20:31:12.898"/>
   </p1510:revLst>
 </p1510:revInfo>
 </file>
@@ -126,7 +134,7 @@
   <pc:docChgLst>
     <pc:chgData name="Tumelo Monese" userId="549178b4a6a13b7c" providerId="LiveId" clId="{5B0F878A-1C9B-4BE3-8404-60FF28E92D73}"/>
     <pc:docChg chg="undo redo custSel addSld delSld modSld addMainMaster delMainMaster">
-      <pc:chgData name="Tumelo Monese" userId="549178b4a6a13b7c" providerId="LiveId" clId="{5B0F878A-1C9B-4BE3-8404-60FF28E92D73}" dt="2025-11-21T14:43:55.282" v="2025" actId="20577"/>
+      <pc:chgData name="Tumelo Monese" userId="549178b4a6a13b7c" providerId="LiveId" clId="{5B0F878A-1C9B-4BE3-8404-60FF28E92D73}" dt="2025-11-21T20:31:39.052" v="2266" actId="20577"/>
       <pc:docMkLst>
         <pc:docMk/>
       </pc:docMkLst>
@@ -607,6 +615,203 @@
             <ac:spMk id="3" creationId="{BE7592B1-E86C-6CBB-0BCB-97A49876BA62}"/>
           </ac:spMkLst>
         </pc:spChg>
+      </pc:sldChg>
+      <pc:sldChg chg="modSp new mod">
+        <pc:chgData name="Tumelo Monese" userId="549178b4a6a13b7c" providerId="LiveId" clId="{5B0F878A-1C9B-4BE3-8404-60FF28E92D73}" dt="2025-11-21T20:24:13.347" v="2099" actId="20577"/>
+        <pc:sldMkLst>
+          <pc:docMk/>
+          <pc:sldMk cId="3757578829" sldId="263"/>
+        </pc:sldMkLst>
+        <pc:spChg chg="mod">
+          <ac:chgData name="Tumelo Monese" userId="549178b4a6a13b7c" providerId="LiveId" clId="{5B0F878A-1C9B-4BE3-8404-60FF28E92D73}" dt="2025-11-21T20:23:06.904" v="2038" actId="20577"/>
+          <ac:spMkLst>
+            <pc:docMk/>
+            <pc:sldMk cId="3757578829" sldId="263"/>
+            <ac:spMk id="2" creationId="{3835B0F8-3EEE-DE4D-EA47-330A2F08C454}"/>
+          </ac:spMkLst>
+        </pc:spChg>
+        <pc:spChg chg="mod">
+          <ac:chgData name="Tumelo Monese" userId="549178b4a6a13b7c" providerId="LiveId" clId="{5B0F878A-1C9B-4BE3-8404-60FF28E92D73}" dt="2025-11-21T20:24:13.347" v="2099" actId="20577"/>
+          <ac:spMkLst>
+            <pc:docMk/>
+            <pc:sldMk cId="3757578829" sldId="263"/>
+            <ac:spMk id="3" creationId="{F0FF4EAC-A851-9942-CAAF-1500551BBD10}"/>
+          </ac:spMkLst>
+        </pc:spChg>
+      </pc:sldChg>
+      <pc:sldChg chg="addSp delSp modSp new mod setBg">
+        <pc:chgData name="Tumelo Monese" userId="549178b4a6a13b7c" providerId="LiveId" clId="{5B0F878A-1C9B-4BE3-8404-60FF28E92D73}" dt="2025-11-21T20:26:29.868" v="2163" actId="26606"/>
+        <pc:sldMkLst>
+          <pc:docMk/>
+          <pc:sldMk cId="15096939" sldId="264"/>
+        </pc:sldMkLst>
+        <pc:spChg chg="mod">
+          <ac:chgData name="Tumelo Monese" userId="549178b4a6a13b7c" providerId="LiveId" clId="{5B0F878A-1C9B-4BE3-8404-60FF28E92D73}" dt="2025-11-21T20:26:29.868" v="2163" actId="26606"/>
+          <ac:spMkLst>
+            <pc:docMk/>
+            <pc:sldMk cId="15096939" sldId="264"/>
+            <ac:spMk id="2" creationId="{C137655E-3CD6-D693-D20B-C3D867F5EB4F}"/>
+          </ac:spMkLst>
+        </pc:spChg>
+        <pc:spChg chg="del">
+          <ac:chgData name="Tumelo Monese" userId="549178b4a6a13b7c" providerId="LiveId" clId="{5B0F878A-1C9B-4BE3-8404-60FF28E92D73}" dt="2025-11-21T20:25:45.955" v="2101" actId="931"/>
+          <ac:spMkLst>
+            <pc:docMk/>
+            <pc:sldMk cId="15096939" sldId="264"/>
+            <ac:spMk id="3" creationId="{CB534BA9-F85C-49FF-3BE3-88F7544344F5}"/>
+          </ac:spMkLst>
+        </pc:spChg>
+        <pc:spChg chg="mod">
+          <ac:chgData name="Tumelo Monese" userId="549178b4a6a13b7c" providerId="LiveId" clId="{5B0F878A-1C9B-4BE3-8404-60FF28E92D73}" dt="2025-11-21T20:26:29.868" v="2163" actId="26606"/>
+          <ac:spMkLst>
+            <pc:docMk/>
+            <pc:sldMk cId="15096939" sldId="264"/>
+            <ac:spMk id="4" creationId="{35F4CCEE-2618-8BFD-6191-0F826B57C796}"/>
+          </ac:spMkLst>
+        </pc:spChg>
+        <pc:spChg chg="add">
+          <ac:chgData name="Tumelo Monese" userId="549178b4a6a13b7c" providerId="LiveId" clId="{5B0F878A-1C9B-4BE3-8404-60FF28E92D73}" dt="2025-11-21T20:26:29.868" v="2163" actId="26606"/>
+          <ac:spMkLst>
+            <pc:docMk/>
+            <pc:sldMk cId="15096939" sldId="264"/>
+            <ac:spMk id="15" creationId="{BD7C2DEF-63C5-495B-BBE5-720E5D12B4D2}"/>
+          </ac:spMkLst>
+        </pc:spChg>
+        <pc:picChg chg="add mod ord">
+          <ac:chgData name="Tumelo Monese" userId="549178b4a6a13b7c" providerId="LiveId" clId="{5B0F878A-1C9B-4BE3-8404-60FF28E92D73}" dt="2025-11-21T20:26:29.868" v="2163" actId="26606"/>
+          <ac:picMkLst>
+            <pc:docMk/>
+            <pc:sldMk cId="15096939" sldId="264"/>
+            <ac:picMk id="6" creationId="{D810CDDF-4EE9-A59D-09E6-B75B338FA1FF}"/>
+          </ac:picMkLst>
+        </pc:picChg>
+        <pc:picChg chg="add">
+          <ac:chgData name="Tumelo Monese" userId="549178b4a6a13b7c" providerId="LiveId" clId="{5B0F878A-1C9B-4BE3-8404-60FF28E92D73}" dt="2025-11-21T20:26:29.868" v="2163" actId="26606"/>
+          <ac:picMkLst>
+            <pc:docMk/>
+            <pc:sldMk cId="15096939" sldId="264"/>
+            <ac:picMk id="11" creationId="{BDFADFB3-3D44-49A8-AE3B-A87C61607F7E}"/>
+          </ac:picMkLst>
+        </pc:picChg>
+        <pc:picChg chg="add">
+          <ac:chgData name="Tumelo Monese" userId="549178b4a6a13b7c" providerId="LiveId" clId="{5B0F878A-1C9B-4BE3-8404-60FF28E92D73}" dt="2025-11-21T20:26:29.868" v="2163" actId="26606"/>
+          <ac:picMkLst>
+            <pc:docMk/>
+            <pc:sldMk cId="15096939" sldId="264"/>
+            <ac:picMk id="13" creationId="{BB912AE0-CAD9-4F8F-A2A2-BDF07D4EDD22}"/>
+          </ac:picMkLst>
+        </pc:picChg>
+        <pc:picChg chg="add">
+          <ac:chgData name="Tumelo Monese" userId="549178b4a6a13b7c" providerId="LiveId" clId="{5B0F878A-1C9B-4BE3-8404-60FF28E92D73}" dt="2025-11-21T20:26:29.868" v="2163" actId="26606"/>
+          <ac:picMkLst>
+            <pc:docMk/>
+            <pc:sldMk cId="15096939" sldId="264"/>
+            <ac:picMk id="17" creationId="{FE21E403-0B61-4473-BE57-AB0F16379674}"/>
+          </ac:picMkLst>
+        </pc:picChg>
+      </pc:sldChg>
+      <pc:sldChg chg="addSp delSp modSp new mod setBg setClrOvrMap">
+        <pc:chgData name="Tumelo Monese" userId="549178b4a6a13b7c" providerId="LiveId" clId="{5B0F878A-1C9B-4BE3-8404-60FF28E92D73}" dt="2025-11-21T20:31:39.052" v="2266" actId="20577"/>
+        <pc:sldMkLst>
+          <pc:docMk/>
+          <pc:sldMk cId="1987340212" sldId="265"/>
+        </pc:sldMkLst>
+        <pc:spChg chg="mod">
+          <ac:chgData name="Tumelo Monese" userId="549178b4a6a13b7c" providerId="LiveId" clId="{5B0F878A-1C9B-4BE3-8404-60FF28E92D73}" dt="2025-11-21T20:30:35.168" v="2198" actId="26606"/>
+          <ac:spMkLst>
+            <pc:docMk/>
+            <pc:sldMk cId="1987340212" sldId="265"/>
+            <ac:spMk id="2" creationId="{4ED925EC-F386-7139-A57B-2EB18B8C7DC9}"/>
+          </ac:spMkLst>
+        </pc:spChg>
+        <pc:spChg chg="del">
+          <ac:chgData name="Tumelo Monese" userId="549178b4a6a13b7c" providerId="LiveId" clId="{5B0F878A-1C9B-4BE3-8404-60FF28E92D73}" dt="2025-11-21T20:28:26.269" v="2165" actId="931"/>
+          <ac:spMkLst>
+            <pc:docMk/>
+            <pc:sldMk cId="1987340212" sldId="265"/>
+            <ac:spMk id="3" creationId="{D3DB1CFE-5CCF-E2FC-17E4-9A23A2D78A12}"/>
+          </ac:spMkLst>
+        </pc:spChg>
+        <pc:spChg chg="mod">
+          <ac:chgData name="Tumelo Monese" userId="549178b4a6a13b7c" providerId="LiveId" clId="{5B0F878A-1C9B-4BE3-8404-60FF28E92D73}" dt="2025-11-21T20:31:39.052" v="2266" actId="20577"/>
+          <ac:spMkLst>
+            <pc:docMk/>
+            <pc:sldMk cId="1987340212" sldId="265"/>
+            <ac:spMk id="4" creationId="{48BA2951-0B02-46FE-BEFE-B5D44B7B3C84}"/>
+          </ac:spMkLst>
+        </pc:spChg>
+        <pc:spChg chg="add del">
+          <ac:chgData name="Tumelo Monese" userId="549178b4a6a13b7c" providerId="LiveId" clId="{5B0F878A-1C9B-4BE3-8404-60FF28E92D73}" dt="2025-11-21T20:30:35.168" v="2198" actId="26606"/>
+          <ac:spMkLst>
+            <pc:docMk/>
+            <pc:sldMk cId="1987340212" sldId="265"/>
+            <ac:spMk id="13" creationId="{03FFF8D3-2EF3-4286-935A-D01BE3C85333}"/>
+          </ac:spMkLst>
+        </pc:spChg>
+        <pc:spChg chg="add del">
+          <ac:chgData name="Tumelo Monese" userId="549178b4a6a13b7c" providerId="LiveId" clId="{5B0F878A-1C9B-4BE3-8404-60FF28E92D73}" dt="2025-11-21T20:30:35.168" v="2198" actId="26606"/>
+          <ac:spMkLst>
+            <pc:docMk/>
+            <pc:sldMk cId="1987340212" sldId="265"/>
+            <ac:spMk id="17" creationId="{E6C57836-126B-4938-8C7A-3C3BCB59D383}"/>
+          </ac:spMkLst>
+        </pc:spChg>
+        <pc:spChg chg="add">
+          <ac:chgData name="Tumelo Monese" userId="549178b4a6a13b7c" providerId="LiveId" clId="{5B0F878A-1C9B-4BE3-8404-60FF28E92D73}" dt="2025-11-21T20:30:35.168" v="2198" actId="26606"/>
+          <ac:spMkLst>
+            <pc:docMk/>
+            <pc:sldMk cId="1987340212" sldId="265"/>
+            <ac:spMk id="24" creationId="{8B836880-BF75-4385-9994-9270F8ACF1A7}"/>
+          </ac:spMkLst>
+        </pc:spChg>
+        <pc:spChg chg="add">
+          <ac:chgData name="Tumelo Monese" userId="549178b4a6a13b7c" providerId="LiveId" clId="{5B0F878A-1C9B-4BE3-8404-60FF28E92D73}" dt="2025-11-21T20:30:35.168" v="2198" actId="26606"/>
+          <ac:spMkLst>
+            <pc:docMk/>
+            <pc:sldMk cId="1987340212" sldId="265"/>
+            <ac:spMk id="28" creationId="{38D32B90-922C-4411-A898-3F03AA808A09}"/>
+          </ac:spMkLst>
+        </pc:spChg>
+        <pc:picChg chg="add mod ord">
+          <ac:chgData name="Tumelo Monese" userId="549178b4a6a13b7c" providerId="LiveId" clId="{5B0F878A-1C9B-4BE3-8404-60FF28E92D73}" dt="2025-11-21T20:31:12.898" v="2199" actId="14826"/>
+          <ac:picMkLst>
+            <pc:docMk/>
+            <pc:sldMk cId="1987340212" sldId="265"/>
+            <ac:picMk id="6" creationId="{1ECD5CF2-3CD1-E3A7-8299-A7825A5E00E9}"/>
+          </ac:picMkLst>
+        </pc:picChg>
+        <pc:picChg chg="add del">
+          <ac:chgData name="Tumelo Monese" userId="549178b4a6a13b7c" providerId="LiveId" clId="{5B0F878A-1C9B-4BE3-8404-60FF28E92D73}" dt="2025-11-21T20:30:35.168" v="2198" actId="26606"/>
+          <ac:picMkLst>
+            <pc:docMk/>
+            <pc:sldMk cId="1987340212" sldId="265"/>
+            <ac:picMk id="11" creationId="{BDFADFB3-3D44-49A8-AE3B-A87C61607F7E}"/>
+          </ac:picMkLst>
+        </pc:picChg>
+        <pc:picChg chg="add del">
+          <ac:chgData name="Tumelo Monese" userId="549178b4a6a13b7c" providerId="LiveId" clId="{5B0F878A-1C9B-4BE3-8404-60FF28E92D73}" dt="2025-11-21T20:30:35.168" v="2198" actId="26606"/>
+          <ac:picMkLst>
+            <pc:docMk/>
+            <pc:sldMk cId="1987340212" sldId="265"/>
+            <ac:picMk id="15" creationId="{CD8CCB43-545E-4064-8BB8-5C492D0F5F57}"/>
+          </ac:picMkLst>
+        </pc:picChg>
+        <pc:picChg chg="add">
+          <ac:chgData name="Tumelo Monese" userId="549178b4a6a13b7c" providerId="LiveId" clId="{5B0F878A-1C9B-4BE3-8404-60FF28E92D73}" dt="2025-11-21T20:30:35.168" v="2198" actId="26606"/>
+          <ac:picMkLst>
+            <pc:docMk/>
+            <pc:sldMk cId="1987340212" sldId="265"/>
+            <ac:picMk id="22" creationId="{CFD580F5-E7BF-4C1D-BEFD-4A4601EBA876}"/>
+          </ac:picMkLst>
+        </pc:picChg>
+        <pc:picChg chg="add">
+          <ac:chgData name="Tumelo Monese" userId="549178b4a6a13b7c" providerId="LiveId" clId="{5B0F878A-1C9B-4BE3-8404-60FF28E92D73}" dt="2025-11-21T20:30:35.168" v="2198" actId="26606"/>
+          <ac:picMkLst>
+            <pc:docMk/>
+            <pc:sldMk cId="1987340212" sldId="265"/>
+            <ac:picMk id="26" creationId="{26BCFBE2-C65F-42E3-A14A-5D04B9842E44}"/>
+          </ac:picMkLst>
+        </pc:picChg>
       </pc:sldChg>
       <pc:sldMasterChg chg="del delSldLayout">
         <pc:chgData name="Tumelo Monese" userId="549178b4a6a13b7c" providerId="LiveId" clId="{5B0F878A-1C9B-4BE3-8404-60FF28E92D73}" dt="2025-11-21T13:36:34.200" v="0" actId="26606"/>
@@ -6782,6 +6987,383 @@
 </p:sld>
 </file>
 
+<file path=ppt/slides/slide10.xml><?xml version="1.0" encoding="utf-8"?>
+<p:sld xmlns:a="http://schemas.openxmlformats.org/drawingml/2006/main" xmlns:r="http://schemas.openxmlformats.org/officeDocument/2006/relationships" xmlns:p="http://schemas.openxmlformats.org/presentationml/2006/main">
+  <p:cSld>
+    <p:bg>
+      <p:bgPr>
+        <a:solidFill>
+          <a:schemeClr val="bg1"/>
+        </a:solidFill>
+        <a:effectLst/>
+      </p:bgPr>
+    </p:bg>
+    <p:spTree>
+      <p:nvGrpSpPr>
+        <p:cNvPr id="1" name=""/>
+        <p:cNvGrpSpPr/>
+        <p:nvPr/>
+      </p:nvGrpSpPr>
+      <p:grpSpPr>
+        <a:xfrm>
+          <a:off x="0" y="0"/>
+          <a:ext cx="0" cy="0"/>
+          <a:chOff x="0" y="0"/>
+          <a:chExt cx="0" cy="0"/>
+        </a:xfrm>
+      </p:grpSpPr>
+      <p:pic>
+        <p:nvPicPr>
+          <p:cNvPr id="22" name="Picture 21">
+            <a:extLst>
+              <a:ext uri="{FF2B5EF4-FFF2-40B4-BE49-F238E27FC236}">
+                <a16:creationId xmlns:a16="http://schemas.microsoft.com/office/drawing/2014/main" id="{CFD580F5-E7BF-4C1D-BEFD-4A4601EBA876}"/>
+              </a:ext>
+              <a:ext uri="{C183D7F6-B498-43B3-948B-1728B52AA6E4}">
+                <adec:decorative xmlns:adec="http://schemas.microsoft.com/office/drawing/2017/decorative" val="1"/>
+              </a:ext>
+            </a:extLst>
+          </p:cNvPr>
+          <p:cNvPicPr>
+            <a:picLocks noGrp="1" noRot="1" noChangeAspect="1" noMove="1" noResize="1" noEditPoints="1" noAdjustHandles="1" noChangeArrowheads="1" noChangeShapeType="1" noCrop="1"/>
+          </p:cNvPicPr>
+          <p:nvPr>
+            <p:extLst>
+              <p:ext uri="{386F3935-93C4-4BCD-93E2-E3B085C9AB24}">
+                <p16:designElem xmlns:p16="http://schemas.microsoft.com/office/powerpoint/2015/main" val="1"/>
+              </p:ext>
+            </p:extLst>
+          </p:nvPr>
+        </p:nvPicPr>
+        <p:blipFill>
+          <a:blip r:embed="rId2">
+            <a:extLst>
+              <a:ext uri="{28A0092B-C50C-407E-A947-70E740481C1C}">
+                <a14:useLocalDpi xmlns:a14="http://schemas.microsoft.com/office/drawing/2010/main" val="0"/>
+              </a:ext>
+            </a:extLst>
+          </a:blip>
+          <a:stretch>
+            <a:fillRect/>
+          </a:stretch>
+        </p:blipFill>
+        <p:spPr>
+          <a:xfrm>
+            <a:off x="0" y="0"/>
+            <a:ext cx="12192000" cy="1441450"/>
+          </a:xfrm>
+          <a:prstGeom prst="rect">
+            <a:avLst/>
+          </a:prstGeom>
+        </p:spPr>
+      </p:pic>
+      <p:sp>
+        <p:nvSpPr>
+          <p:cNvPr id="24" name="Rectangle 23">
+            <a:extLst>
+              <a:ext uri="{FF2B5EF4-FFF2-40B4-BE49-F238E27FC236}">
+                <a16:creationId xmlns:a16="http://schemas.microsoft.com/office/drawing/2014/main" id="{8B836880-BF75-4385-9994-9270F8ACF1A7}"/>
+              </a:ext>
+              <a:ext uri="{C183D7F6-B498-43B3-948B-1728B52AA6E4}">
+                <adec:decorative xmlns:adec="http://schemas.microsoft.com/office/drawing/2017/decorative" val="1"/>
+              </a:ext>
+            </a:extLst>
+          </p:cNvPr>
+          <p:cNvSpPr>
+            <a:spLocks noGrp="1" noRot="1" noChangeAspect="1" noMove="1" noResize="1" noEditPoints="1" noAdjustHandles="1" noChangeArrowheads="1" noChangeShapeType="1" noTextEdit="1"/>
+          </p:cNvSpPr>
+          <p:nvPr>
+            <p:extLst>
+              <p:ext uri="{386F3935-93C4-4BCD-93E2-E3B085C9AB24}">
+                <p16:designElem xmlns:p16="http://schemas.microsoft.com/office/powerpoint/2015/main" val="1"/>
+              </p:ext>
+            </p:extLst>
+          </p:nvPr>
+        </p:nvSpPr>
+        <p:spPr>
+          <a:xfrm>
+            <a:off x="0" y="0"/>
+            <a:ext cx="12192000" cy="6858000"/>
+          </a:xfrm>
+          <a:prstGeom prst="rect">
+            <a:avLst/>
+          </a:prstGeom>
+          <a:solidFill>
+            <a:schemeClr val="bg1"/>
+          </a:solidFill>
+          <a:ln>
+            <a:noFill/>
+          </a:ln>
+        </p:spPr>
+        <p:style>
+          <a:lnRef idx="2">
+            <a:schemeClr val="accent1">
+              <a:shade val="50000"/>
+            </a:schemeClr>
+          </a:lnRef>
+          <a:fillRef idx="1">
+            <a:schemeClr val="accent1"/>
+          </a:fillRef>
+          <a:effectRef idx="0">
+            <a:schemeClr val="accent1"/>
+          </a:effectRef>
+          <a:fontRef idx="minor">
+            <a:schemeClr val="lt1"/>
+          </a:fontRef>
+        </p:style>
+        <p:txBody>
+          <a:bodyPr rtlCol="0" anchor="ctr"/>
+          <a:lstStyle/>
+          <a:p>
+            <a:pPr algn="ctr"/>
+            <a:endParaRPr lang="en-US"/>
+          </a:p>
+        </p:txBody>
+      </p:sp>
+      <p:pic>
+        <p:nvPicPr>
+          <p:cNvPr id="26" name="Picture 25">
+            <a:extLst>
+              <a:ext uri="{FF2B5EF4-FFF2-40B4-BE49-F238E27FC236}">
+                <a16:creationId xmlns:a16="http://schemas.microsoft.com/office/drawing/2014/main" id="{26BCFBE2-C65F-42E3-A14A-5D04B9842E44}"/>
+              </a:ext>
+              <a:ext uri="{C183D7F6-B498-43B3-948B-1728B52AA6E4}">
+                <adec:decorative xmlns:adec="http://schemas.microsoft.com/office/drawing/2017/decorative" val="1"/>
+              </a:ext>
+            </a:extLst>
+          </p:cNvPr>
+          <p:cNvPicPr>
+            <a:picLocks noGrp="1" noRot="1" noChangeAspect="1" noMove="1" noResize="1" noEditPoints="1" noAdjustHandles="1" noChangeArrowheads="1" noChangeShapeType="1" noCrop="1"/>
+          </p:cNvPicPr>
+          <p:nvPr>
+            <p:extLst>
+              <p:ext uri="{386F3935-93C4-4BCD-93E2-E3B085C9AB24}">
+                <p16:designElem xmlns:p16="http://schemas.microsoft.com/office/powerpoint/2015/main" val="1"/>
+              </p:ext>
+            </p:extLst>
+          </p:nvPr>
+        </p:nvPicPr>
+        <p:blipFill>
+          <a:blip r:embed="rId2">
+            <a:extLst>
+              <a:ext uri="{28A0092B-C50C-407E-A947-70E740481C1C}">
+                <a14:useLocalDpi xmlns:a14="http://schemas.microsoft.com/office/drawing/2010/main" val="0"/>
+              </a:ext>
+            </a:extLst>
+          </a:blip>
+          <a:stretch>
+            <a:fillRect/>
+          </a:stretch>
+        </p:blipFill>
+        <p:spPr>
+          <a:xfrm>
+            <a:off x="0" y="0"/>
+            <a:ext cx="12192000" cy="1441450"/>
+          </a:xfrm>
+          <a:prstGeom prst="rect">
+            <a:avLst/>
+          </a:prstGeom>
+        </p:spPr>
+      </p:pic>
+      <p:sp>
+        <p:nvSpPr>
+          <p:cNvPr id="2" name="Title 1">
+            <a:extLst>
+              <a:ext uri="{FF2B5EF4-FFF2-40B4-BE49-F238E27FC236}">
+                <a16:creationId xmlns:a16="http://schemas.microsoft.com/office/drawing/2014/main" id="{4ED925EC-F386-7139-A57B-2EB18B8C7DC9}"/>
+              </a:ext>
+            </a:extLst>
+          </p:cNvPr>
+          <p:cNvSpPr>
+            <a:spLocks noGrp="1"/>
+          </p:cNvSpPr>
+          <p:nvPr>
+            <p:ph type="title"/>
+          </p:nvPr>
+        </p:nvSpPr>
+        <p:spPr>
+          <a:xfrm>
+            <a:off x="685800" y="764373"/>
+            <a:ext cx="3306744" cy="1293028"/>
+          </a:xfrm>
+        </p:spPr>
+        <p:txBody>
+          <a:bodyPr vert="horz" lIns="91440" tIns="45720" rIns="91440" bIns="45720" rtlCol="0" anchor="ctr">
+            <a:normAutofit/>
+          </a:bodyPr>
+          <a:lstStyle/>
+          <a:p>
+            <a:pPr algn="r"/>
+            <a:r>
+              <a:rPr lang="en-US" sz="3000"/>
+              <a:t>Academic manager view</a:t>
+            </a:r>
+          </a:p>
+        </p:txBody>
+      </p:sp>
+      <p:sp>
+        <p:nvSpPr>
+          <p:cNvPr id="4" name="Text Placeholder 3">
+            <a:extLst>
+              <a:ext uri="{FF2B5EF4-FFF2-40B4-BE49-F238E27FC236}">
+                <a16:creationId xmlns:a16="http://schemas.microsoft.com/office/drawing/2014/main" id="{48BA2951-0B02-46FE-BEFE-B5D44B7B3C84}"/>
+              </a:ext>
+            </a:extLst>
+          </p:cNvPr>
+          <p:cNvSpPr>
+            <a:spLocks noGrp="1"/>
+          </p:cNvSpPr>
+          <p:nvPr>
+            <p:ph type="body" sz="half" idx="2"/>
+          </p:nvPr>
+        </p:nvSpPr>
+        <p:spPr>
+          <a:xfrm>
+            <a:off x="685801" y="2194560"/>
+            <a:ext cx="3306742" cy="4024125"/>
+          </a:xfrm>
+        </p:spPr>
+        <p:txBody>
+          <a:bodyPr vert="horz" lIns="91440" tIns="45720" rIns="91440" bIns="45720" rtlCol="0">
+            <a:normAutofit/>
+          </a:bodyPr>
+          <a:lstStyle/>
+          <a:p>
+            <a:pPr indent="-228600">
+              <a:buFont typeface="Arial" panose="020B0604020202020204" pitchFamily="34" charset="0"/>
+              <a:buChar char="•"/>
+            </a:pPr>
+            <a:r>
+              <a:rPr lang="en-US" dirty="0"/>
+              <a:t>Academic managers dashboard to view claims </a:t>
+            </a:r>
+            <a:r>
+              <a:rPr lang="en-US"/>
+              <a:t>already verified</a:t>
+            </a:r>
+          </a:p>
+        </p:txBody>
+      </p:sp>
+      <p:sp>
+        <p:nvSpPr>
+          <p:cNvPr id="28" name="Rounded Rectangle 14">
+            <a:extLst>
+              <a:ext uri="{FF2B5EF4-FFF2-40B4-BE49-F238E27FC236}">
+                <a16:creationId xmlns:a16="http://schemas.microsoft.com/office/drawing/2014/main" id="{38D32B90-922C-4411-A898-3F03AA808A09}"/>
+              </a:ext>
+              <a:ext uri="{C183D7F6-B498-43B3-948B-1728B52AA6E4}">
+                <adec:decorative xmlns:adec="http://schemas.microsoft.com/office/drawing/2017/decorative" val="1"/>
+              </a:ext>
+            </a:extLst>
+          </p:cNvPr>
+          <p:cNvSpPr>
+            <a:spLocks noGrp="1" noRot="1" noChangeAspect="1" noMove="1" noResize="1" noEditPoints="1" noAdjustHandles="1" noChangeArrowheads="1" noChangeShapeType="1" noTextEdit="1"/>
+          </p:cNvSpPr>
+          <p:nvPr>
+            <p:extLst>
+              <p:ext uri="{386F3935-93C4-4BCD-93E2-E3B085C9AB24}">
+                <p16:designElem xmlns:p16="http://schemas.microsoft.com/office/powerpoint/2015/main" val="1"/>
+              </p:ext>
+            </p:extLst>
+          </p:nvPr>
+        </p:nvSpPr>
+        <p:spPr>
+          <a:xfrm>
+            <a:off x="4636008" y="1066164"/>
+            <a:ext cx="6765949" cy="5148371"/>
+          </a:xfrm>
+          <a:prstGeom prst="roundRect">
+            <a:avLst>
+              <a:gd name="adj" fmla="val 2403"/>
+            </a:avLst>
+          </a:prstGeom>
+          <a:solidFill>
+            <a:srgbClr val="FFFFFF"/>
+          </a:solidFill>
+          <a:ln>
+            <a:noFill/>
+          </a:ln>
+          <a:effectLst>
+            <a:innerShdw blurRad="114300">
+              <a:prstClr val="black"/>
+            </a:innerShdw>
+          </a:effectLst>
+        </p:spPr>
+        <p:style>
+          <a:lnRef idx="2">
+            <a:schemeClr val="accent1">
+              <a:shade val="50000"/>
+            </a:schemeClr>
+          </a:lnRef>
+          <a:fillRef idx="1">
+            <a:schemeClr val="accent1"/>
+          </a:fillRef>
+          <a:effectRef idx="0">
+            <a:schemeClr val="accent1"/>
+          </a:effectRef>
+          <a:fontRef idx="minor">
+            <a:schemeClr val="lt1"/>
+          </a:fontRef>
+        </p:style>
+        <p:txBody>
+          <a:bodyPr rtlCol="0" anchor="ctr"/>
+          <a:lstStyle/>
+          <a:p>
+            <a:pPr algn="ctr"/>
+            <a:endParaRPr lang="en-US"/>
+          </a:p>
+        </p:txBody>
+      </p:sp>
+      <p:pic>
+        <p:nvPicPr>
+          <p:cNvPr id="6" name="Picture Placeholder 5">
+            <a:extLst>
+              <a:ext uri="{FF2B5EF4-FFF2-40B4-BE49-F238E27FC236}">
+                <a16:creationId xmlns:a16="http://schemas.microsoft.com/office/drawing/2014/main" id="{1ECD5CF2-3CD1-E3A7-8299-A7825A5E00E9}"/>
+              </a:ext>
+            </a:extLst>
+          </p:cNvPr>
+          <p:cNvPicPr>
+            <a:picLocks noGrp="1" noChangeAspect="1"/>
+          </p:cNvPicPr>
+          <p:nvPr>
+            <p:ph type="pic" idx="1"/>
+          </p:nvPr>
+        </p:nvPicPr>
+        <p:blipFill>
+          <a:blip r:embed="rId3">
+            <a:extLst>
+              <a:ext uri="{28A0092B-C50C-407E-A947-70E740481C1C}">
+                <a14:useLocalDpi xmlns:a14="http://schemas.microsoft.com/office/drawing/2010/main" val="0"/>
+              </a:ext>
+            </a:extLst>
+          </a:blip>
+          <a:srcRect l="14078" r="14078"/>
+          <a:stretch/>
+        </p:blipFill>
+        <p:spPr>
+          <a:xfrm>
+            <a:off x="4955339" y="1336566"/>
+            <a:ext cx="6127287" cy="4607567"/>
+          </a:xfrm>
+          <a:prstGeom prst="rect">
+            <a:avLst/>
+          </a:prstGeom>
+        </p:spPr>
+      </p:pic>
+    </p:spTree>
+    <p:extLst>
+      <p:ext uri="{BB962C8B-B14F-4D97-AF65-F5344CB8AC3E}">
+        <p14:creationId xmlns:p14="http://schemas.microsoft.com/office/powerpoint/2010/main" val="1987340212"/>
+      </p:ext>
+    </p:extLst>
+  </p:cSld>
+  <p:clrMapOvr>
+    <a:masterClrMapping/>
+  </p:clrMapOvr>
+</p:sld>
+</file>
+
 <file path=ppt/slides/slide2.xml><?xml version="1.0" encoding="utf-8"?>
 <p:sld xmlns:a="http://schemas.openxmlformats.org/drawingml/2006/main" xmlns:r="http://schemas.openxmlformats.org/officeDocument/2006/relationships" xmlns:p="http://schemas.openxmlformats.org/presentationml/2006/main">
   <p:cSld>
@@ -7413,6 +7995,475 @@
     <p:extLst>
       <p:ext uri="{BB962C8B-B14F-4D97-AF65-F5344CB8AC3E}">
         <p14:creationId xmlns:p14="http://schemas.microsoft.com/office/powerpoint/2010/main" val="2754514147"/>
+      </p:ext>
+    </p:extLst>
+  </p:cSld>
+  <p:clrMapOvr>
+    <a:masterClrMapping/>
+  </p:clrMapOvr>
+</p:sld>
+</file>
+
+<file path=ppt/slides/slide8.xml><?xml version="1.0" encoding="utf-8"?>
+<p:sld xmlns:a="http://schemas.openxmlformats.org/drawingml/2006/main" xmlns:r="http://schemas.openxmlformats.org/officeDocument/2006/relationships" xmlns:p="http://schemas.openxmlformats.org/presentationml/2006/main">
+  <p:cSld>
+    <p:spTree>
+      <p:nvGrpSpPr>
+        <p:cNvPr id="1" name=""/>
+        <p:cNvGrpSpPr/>
+        <p:nvPr/>
+      </p:nvGrpSpPr>
+      <p:grpSpPr>
+        <a:xfrm>
+          <a:off x="0" y="0"/>
+          <a:ext cx="0" cy="0"/>
+          <a:chOff x="0" y="0"/>
+          <a:chExt cx="0" cy="0"/>
+        </a:xfrm>
+      </p:grpSpPr>
+      <p:sp>
+        <p:nvSpPr>
+          <p:cNvPr id="2" name="Title 1">
+            <a:extLst>
+              <a:ext uri="{FF2B5EF4-FFF2-40B4-BE49-F238E27FC236}">
+                <a16:creationId xmlns:a16="http://schemas.microsoft.com/office/drawing/2014/main" id="{3835B0F8-3EEE-DE4D-EA47-330A2F08C454}"/>
+              </a:ext>
+            </a:extLst>
+          </p:cNvPr>
+          <p:cNvSpPr>
+            <a:spLocks noGrp="1"/>
+          </p:cNvSpPr>
+          <p:nvPr>
+            <p:ph type="title"/>
+          </p:nvPr>
+        </p:nvSpPr>
+        <p:spPr/>
+        <p:txBody>
+          <a:bodyPr/>
+          <a:lstStyle/>
+          <a:p>
+            <a:r>
+              <a:rPr lang="en-ZA" dirty="0"/>
+              <a:t>verification</a:t>
+            </a:r>
+          </a:p>
+        </p:txBody>
+      </p:sp>
+      <p:sp>
+        <p:nvSpPr>
+          <p:cNvPr id="3" name="Content Placeholder 2">
+            <a:extLst>
+              <a:ext uri="{FF2B5EF4-FFF2-40B4-BE49-F238E27FC236}">
+                <a16:creationId xmlns:a16="http://schemas.microsoft.com/office/drawing/2014/main" id="{F0FF4EAC-A851-9942-CAAF-1500551BBD10}"/>
+              </a:ext>
+            </a:extLst>
+          </p:cNvPr>
+          <p:cNvSpPr>
+            <a:spLocks noGrp="1"/>
+          </p:cNvSpPr>
+          <p:nvPr>
+            <p:ph idx="1"/>
+          </p:nvPr>
+        </p:nvSpPr>
+        <p:spPr/>
+        <p:txBody>
+          <a:bodyPr/>
+          <a:lstStyle/>
+          <a:p>
+            <a:r>
+              <a:rPr lang="en-ZA" dirty="0"/>
+              <a:t>System checks for:</a:t>
+            </a:r>
+          </a:p>
+          <a:p>
+            <a:pPr lvl="1"/>
+            <a:r>
+              <a:rPr lang="en-ZA" dirty="0"/>
+              <a:t>Hours worked are between 0.5 to 200 hours</a:t>
+            </a:r>
+          </a:p>
+          <a:p>
+            <a:pPr lvl="1"/>
+            <a:r>
+              <a:rPr lang="en-ZA" dirty="0"/>
+              <a:t>Hourly rate charged is between R1 and R10,000</a:t>
+            </a:r>
+          </a:p>
+          <a:p>
+            <a:r>
+              <a:rPr lang="en-ZA" dirty="0"/>
+              <a:t>Claims failing these checks are automatically rejected with clear error messages </a:t>
+            </a:r>
+          </a:p>
+          <a:p>
+            <a:r>
+              <a:rPr lang="en-ZA" dirty="0"/>
+              <a:t>Valid claims are marked 'Verified' and sent for managerial approval.</a:t>
+            </a:r>
+          </a:p>
+          <a:p>
+            <a:endParaRPr lang="en-ZA" dirty="0"/>
+          </a:p>
+        </p:txBody>
+      </p:sp>
+    </p:spTree>
+    <p:extLst>
+      <p:ext uri="{BB962C8B-B14F-4D97-AF65-F5344CB8AC3E}">
+        <p14:creationId xmlns:p14="http://schemas.microsoft.com/office/powerpoint/2010/main" val="3757578829"/>
+      </p:ext>
+    </p:extLst>
+  </p:cSld>
+  <p:clrMapOvr>
+    <a:masterClrMapping/>
+  </p:clrMapOvr>
+</p:sld>
+</file>
+
+<file path=ppt/slides/slide9.xml><?xml version="1.0" encoding="utf-8"?>
+<p:sld xmlns:a="http://schemas.openxmlformats.org/drawingml/2006/main" xmlns:r="http://schemas.openxmlformats.org/officeDocument/2006/relationships" xmlns:p="http://schemas.openxmlformats.org/presentationml/2006/main">
+  <p:cSld>
+    <p:bg>
+      <p:bgPr>
+        <a:solidFill>
+          <a:schemeClr val="bg1"/>
+        </a:solidFill>
+        <a:effectLst/>
+      </p:bgPr>
+    </p:bg>
+    <p:spTree>
+      <p:nvGrpSpPr>
+        <p:cNvPr id="1" name=""/>
+        <p:cNvGrpSpPr/>
+        <p:nvPr/>
+      </p:nvGrpSpPr>
+      <p:grpSpPr>
+        <a:xfrm>
+          <a:off x="0" y="0"/>
+          <a:ext cx="0" cy="0"/>
+          <a:chOff x="0" y="0"/>
+          <a:chExt cx="0" cy="0"/>
+        </a:xfrm>
+      </p:grpSpPr>
+      <p:pic>
+        <p:nvPicPr>
+          <p:cNvPr id="11" name="Picture 10">
+            <a:extLst>
+              <a:ext uri="{FF2B5EF4-FFF2-40B4-BE49-F238E27FC236}">
+                <a16:creationId xmlns:a16="http://schemas.microsoft.com/office/drawing/2014/main" id="{BDFADFB3-3D44-49A8-AE3B-A87C61607F7E}"/>
+              </a:ext>
+              <a:ext uri="{C183D7F6-B498-43B3-948B-1728B52AA6E4}">
+                <adec:decorative xmlns:adec="http://schemas.microsoft.com/office/drawing/2017/decorative" val="1"/>
+              </a:ext>
+            </a:extLst>
+          </p:cNvPr>
+          <p:cNvPicPr>
+            <a:picLocks noGrp="1" noRot="1" noChangeAspect="1" noMove="1" noResize="1" noEditPoints="1" noAdjustHandles="1" noChangeArrowheads="1" noChangeShapeType="1" noCrop="1"/>
+          </p:cNvPicPr>
+          <p:nvPr>
+            <p:extLst>
+              <p:ext uri="{386F3935-93C4-4BCD-93E2-E3B085C9AB24}">
+                <p16:designElem xmlns:p16="http://schemas.microsoft.com/office/powerpoint/2015/main" val="1"/>
+              </p:ext>
+            </p:extLst>
+          </p:nvPr>
+        </p:nvPicPr>
+        <p:blipFill>
+          <a:blip r:embed="rId2">
+            <a:extLst>
+              <a:ext uri="{28A0092B-C50C-407E-A947-70E740481C1C}">
+                <a14:useLocalDpi xmlns:a14="http://schemas.microsoft.com/office/drawing/2010/main" val="0"/>
+              </a:ext>
+            </a:extLst>
+          </a:blip>
+          <a:stretch>
+            <a:fillRect/>
+          </a:stretch>
+        </p:blipFill>
+        <p:spPr>
+          <a:xfrm>
+            <a:off x="0" y="0"/>
+            <a:ext cx="12192000" cy="1441450"/>
+          </a:xfrm>
+          <a:prstGeom prst="rect">
+            <a:avLst/>
+          </a:prstGeom>
+        </p:spPr>
+      </p:pic>
+      <p:pic>
+        <p:nvPicPr>
+          <p:cNvPr id="13" name="Picture 12">
+            <a:extLst>
+              <a:ext uri="{FF2B5EF4-FFF2-40B4-BE49-F238E27FC236}">
+                <a16:creationId xmlns:a16="http://schemas.microsoft.com/office/drawing/2014/main" id="{BB912AE0-CAD9-4F8F-A2A2-BDF07D4EDD22}"/>
+              </a:ext>
+              <a:ext uri="{C183D7F6-B498-43B3-948B-1728B52AA6E4}">
+                <adec:decorative xmlns:adec="http://schemas.microsoft.com/office/drawing/2017/decorative" val="1"/>
+              </a:ext>
+            </a:extLst>
+          </p:cNvPr>
+          <p:cNvPicPr>
+            <a:picLocks noGrp="1" noRot="1" noChangeAspect="1" noMove="1" noResize="1" noEditPoints="1" noAdjustHandles="1" noChangeArrowheads="1" noChangeShapeType="1" noCrop="1"/>
+          </p:cNvPicPr>
+          <p:nvPr>
+            <p:extLst>
+              <p:ext uri="{386F3935-93C4-4BCD-93E2-E3B085C9AB24}">
+                <p16:designElem xmlns:p16="http://schemas.microsoft.com/office/powerpoint/2015/main" val="1"/>
+              </p:ext>
+            </p:extLst>
+          </p:nvPr>
+        </p:nvPicPr>
+        <p:blipFill>
+          <a:blip r:embed="rId3">
+            <a:extLst>
+              <a:ext uri="{28A0092B-C50C-407E-A947-70E740481C1C}">
+                <a14:useLocalDpi xmlns:a14="http://schemas.microsoft.com/office/drawing/2010/main" val="0"/>
+              </a:ext>
+            </a:extLst>
+          </a:blip>
+          <a:stretch>
+            <a:fillRect/>
+          </a:stretch>
+        </p:blipFill>
+        <p:spPr>
+          <a:xfrm>
+            <a:off x="0" y="4375150"/>
+            <a:ext cx="12192000" cy="2482850"/>
+          </a:xfrm>
+          <a:prstGeom prst="rect">
+            <a:avLst/>
+          </a:prstGeom>
+        </p:spPr>
+      </p:pic>
+      <p:sp useBgFill="1">
+        <p:nvSpPr>
+          <p:cNvPr id="15" name="Rectangle 14">
+            <a:extLst>
+              <a:ext uri="{FF2B5EF4-FFF2-40B4-BE49-F238E27FC236}">
+                <a16:creationId xmlns:a16="http://schemas.microsoft.com/office/drawing/2014/main" id="{BD7C2DEF-63C5-495B-BBE5-720E5D12B4D2}"/>
+              </a:ext>
+              <a:ext uri="{C183D7F6-B498-43B3-948B-1728B52AA6E4}">
+                <adec:decorative xmlns:adec="http://schemas.microsoft.com/office/drawing/2017/decorative" val="1"/>
+              </a:ext>
+            </a:extLst>
+          </p:cNvPr>
+          <p:cNvSpPr>
+            <a:spLocks noGrp="1" noRot="1" noChangeAspect="1" noMove="1" noResize="1" noEditPoints="1" noAdjustHandles="1" noChangeArrowheads="1" noChangeShapeType="1" noTextEdit="1"/>
+          </p:cNvSpPr>
+          <p:nvPr>
+            <p:extLst>
+              <p:ext uri="{386F3935-93C4-4BCD-93E2-E3B085C9AB24}">
+                <p16:designElem xmlns:p16="http://schemas.microsoft.com/office/powerpoint/2015/main" val="1"/>
+              </p:ext>
+            </p:extLst>
+          </p:nvPr>
+        </p:nvSpPr>
+        <p:spPr>
+          <a:xfrm>
+            <a:off x="0" y="0"/>
+            <a:ext cx="12192000" cy="6858000"/>
+          </a:xfrm>
+          <a:prstGeom prst="rect">
+            <a:avLst/>
+          </a:prstGeom>
+          <a:ln>
+            <a:noFill/>
+          </a:ln>
+        </p:spPr>
+        <p:style>
+          <a:lnRef idx="2">
+            <a:schemeClr val="accent1">
+              <a:shade val="50000"/>
+            </a:schemeClr>
+          </a:lnRef>
+          <a:fillRef idx="1">
+            <a:schemeClr val="accent1"/>
+          </a:fillRef>
+          <a:effectRef idx="0">
+            <a:schemeClr val="accent1"/>
+          </a:effectRef>
+          <a:fontRef idx="minor">
+            <a:schemeClr val="lt1"/>
+          </a:fontRef>
+        </p:style>
+        <p:txBody>
+          <a:bodyPr rtlCol="0" anchor="ctr"/>
+          <a:lstStyle/>
+          <a:p>
+            <a:pPr algn="ctr"/>
+            <a:endParaRPr lang="en-US"/>
+          </a:p>
+        </p:txBody>
+      </p:sp>
+      <p:pic>
+        <p:nvPicPr>
+          <p:cNvPr id="17" name="Picture 16">
+            <a:extLst>
+              <a:ext uri="{FF2B5EF4-FFF2-40B4-BE49-F238E27FC236}">
+                <a16:creationId xmlns:a16="http://schemas.microsoft.com/office/drawing/2014/main" id="{FE21E403-0B61-4473-BE57-AB0F16379674}"/>
+              </a:ext>
+              <a:ext uri="{C183D7F6-B498-43B3-948B-1728B52AA6E4}">
+                <adec:decorative xmlns:adec="http://schemas.microsoft.com/office/drawing/2017/decorative" val="1"/>
+              </a:ext>
+            </a:extLst>
+          </p:cNvPr>
+          <p:cNvPicPr>
+            <a:picLocks noGrp="1" noRot="1" noChangeAspect="1" noMove="1" noResize="1" noEditPoints="1" noAdjustHandles="1" noChangeArrowheads="1" noChangeShapeType="1" noCrop="1"/>
+          </p:cNvPicPr>
+          <p:nvPr>
+            <p:extLst>
+              <p:ext uri="{386F3935-93C4-4BCD-93E2-E3B085C9AB24}">
+                <p16:designElem xmlns:p16="http://schemas.microsoft.com/office/powerpoint/2015/main" val="1"/>
+              </p:ext>
+            </p:extLst>
+          </p:nvPr>
+        </p:nvPicPr>
+        <p:blipFill>
+          <a:blip r:embed="rId2">
+            <a:extLst>
+              <a:ext uri="{28A0092B-C50C-407E-A947-70E740481C1C}">
+                <a14:useLocalDpi xmlns:a14="http://schemas.microsoft.com/office/drawing/2010/main" val="0"/>
+              </a:ext>
+            </a:extLst>
+          </a:blip>
+          <a:stretch>
+            <a:fillRect/>
+          </a:stretch>
+        </p:blipFill>
+        <p:spPr>
+          <a:xfrm>
+            <a:off x="0" y="0"/>
+            <a:ext cx="12192000" cy="1441450"/>
+          </a:xfrm>
+          <a:prstGeom prst="rect">
+            <a:avLst/>
+          </a:prstGeom>
+        </p:spPr>
+      </p:pic>
+      <p:sp>
+        <p:nvSpPr>
+          <p:cNvPr id="2" name="Title 1">
+            <a:extLst>
+              <a:ext uri="{FF2B5EF4-FFF2-40B4-BE49-F238E27FC236}">
+                <a16:creationId xmlns:a16="http://schemas.microsoft.com/office/drawing/2014/main" id="{C137655E-3CD6-D693-D20B-C3D867F5EB4F}"/>
+              </a:ext>
+            </a:extLst>
+          </p:cNvPr>
+          <p:cNvSpPr>
+            <a:spLocks noGrp="1"/>
+          </p:cNvSpPr>
+          <p:nvPr>
+            <p:ph type="title"/>
+          </p:nvPr>
+        </p:nvSpPr>
+        <p:spPr>
+          <a:xfrm>
+            <a:off x="636696" y="643464"/>
+            <a:ext cx="3761964" cy="3273061"/>
+          </a:xfrm>
+          <a:noFill/>
+          <a:ln w="19050">
+            <a:noFill/>
+            <a:prstDash val="dash"/>
+          </a:ln>
+        </p:spPr>
+        <p:txBody>
+          <a:bodyPr vert="horz" lIns="91440" tIns="45720" rIns="91440" bIns="45720" rtlCol="0" anchor="b">
+            <a:normAutofit/>
+          </a:bodyPr>
+          <a:lstStyle/>
+          <a:p>
+            <a:pPr algn="r"/>
+            <a:r>
+              <a:rPr lang="en-US" sz="4800"/>
+              <a:t>Claim submission form</a:t>
+            </a:r>
+          </a:p>
+        </p:txBody>
+      </p:sp>
+      <p:sp>
+        <p:nvSpPr>
+          <p:cNvPr id="4" name="Text Placeholder 3">
+            <a:extLst>
+              <a:ext uri="{FF2B5EF4-FFF2-40B4-BE49-F238E27FC236}">
+                <a16:creationId xmlns:a16="http://schemas.microsoft.com/office/drawing/2014/main" id="{35F4CCEE-2618-8BFD-6191-0F826B57C796}"/>
+              </a:ext>
+            </a:extLst>
+          </p:cNvPr>
+          <p:cNvSpPr>
+            <a:spLocks noGrp="1"/>
+          </p:cNvSpPr>
+          <p:nvPr>
+            <p:ph type="body" sz="half" idx="2"/>
+          </p:nvPr>
+        </p:nvSpPr>
+        <p:spPr>
+          <a:xfrm>
+            <a:off x="636695" y="3923151"/>
+            <a:ext cx="3761965" cy="2293885"/>
+          </a:xfrm>
+          <a:noFill/>
+          <a:ln w="19050">
+            <a:noFill/>
+            <a:prstDash val="dash"/>
+          </a:ln>
+        </p:spPr>
+        <p:txBody>
+          <a:bodyPr vert="horz" lIns="91440" tIns="45720" rIns="91440" bIns="45720" rtlCol="0">
+            <a:normAutofit/>
+          </a:bodyPr>
+          <a:lstStyle/>
+          <a:p>
+            <a:pPr algn="r"/>
+            <a:r>
+              <a:rPr lang="en-US" sz="2000" dirty="0"/>
+              <a:t>Form used by lecturer to submit claims</a:t>
+            </a:r>
+          </a:p>
+        </p:txBody>
+      </p:sp>
+      <p:pic>
+        <p:nvPicPr>
+          <p:cNvPr id="6" name="Picture Placeholder 5" descr="A screenshot of a computer&#10;&#10;AI-generated content may be incorrect.">
+            <a:extLst>
+              <a:ext uri="{FF2B5EF4-FFF2-40B4-BE49-F238E27FC236}">
+                <a16:creationId xmlns:a16="http://schemas.microsoft.com/office/drawing/2014/main" id="{D810CDDF-4EE9-A59D-09E6-B75B338FA1FF}"/>
+              </a:ext>
+            </a:extLst>
+          </p:cNvPr>
+          <p:cNvPicPr>
+            <a:picLocks noGrp="1" noChangeAspect="1"/>
+          </p:cNvPicPr>
+          <p:nvPr>
+            <p:ph type="pic" idx="1"/>
+          </p:nvPr>
+        </p:nvPicPr>
+        <p:blipFill>
+          <a:blip r:embed="rId4">
+            <a:extLst>
+              <a:ext uri="{28A0092B-C50C-407E-A947-70E740481C1C}">
+                <a14:useLocalDpi xmlns:a14="http://schemas.microsoft.com/office/drawing/2010/main" val="0"/>
+              </a:ext>
+            </a:extLst>
+          </a:blip>
+          <a:srcRect l="13570" r="13570"/>
+          <a:stretch>
+            <a:fillRect/>
+          </a:stretch>
+        </p:blipFill>
+        <p:spPr>
+          <a:xfrm>
+            <a:off x="6430599" y="941122"/>
+            <a:ext cx="3410044" cy="5115048"/>
+          </a:xfrm>
+          <a:prstGeom prst="rect">
+            <a:avLst/>
+          </a:prstGeom>
+        </p:spPr>
+      </p:pic>
+    </p:spTree>
+    <p:extLst>
+      <p:ext uri="{BB962C8B-B14F-4D97-AF65-F5344CB8AC3E}">
+        <p14:creationId xmlns:p14="http://schemas.microsoft.com/office/powerpoint/2010/main" val="15096939"/>
       </p:ext>
     </p:extLst>
   </p:cSld>

</xml_diff>